<commit_message>
actualizar o numero de aluno
</commit_message>
<xml_diff>
--- a/Letrinhas 0.pptx
+++ b/Letrinhas 0.pptx
@@ -325,7 +325,7 @@
             <a:fld id="{C7C07E6F-C202-45DB-B271-3691A96DB90B}" type="datetimeFigureOut">
               <a:rPr lang="pt-PT" smtClean="0"/>
               <a:pPr/>
-              <a:t>28/03/2014</a:t>
+              <a:t>28-03-2014</a:t>
             </a:fld>
             <a:endParaRPr lang="pt-PT"/>
           </a:p>
@@ -365,7 +365,7 @@
             <a:fld id="{E72D8762-0048-4463-BB55-DBEE29A1CDAB}" type="slidenum">
               <a:rPr lang="pt-PT" smtClean="0"/>
               <a:pPr/>
-              <a:t>‹#›</a:t>
+              <a:t>‹nº›</a:t>
             </a:fld>
             <a:endParaRPr lang="pt-PT"/>
           </a:p>
@@ -521,7 +521,7 @@
             <a:fld id="{C7C07E6F-C202-45DB-B271-3691A96DB90B}" type="datetimeFigureOut">
               <a:rPr lang="pt-PT" smtClean="0"/>
               <a:pPr/>
-              <a:t>28/03/2014</a:t>
+              <a:t>28-03-2014</a:t>
             </a:fld>
             <a:endParaRPr lang="pt-PT"/>
           </a:p>
@@ -568,7 +568,7 @@
             <a:fld id="{E72D8762-0048-4463-BB55-DBEE29A1CDAB}" type="slidenum">
               <a:rPr lang="pt-PT" smtClean="0"/>
               <a:pPr/>
-              <a:t>‹#›</a:t>
+              <a:t>‹nº›</a:t>
             </a:fld>
             <a:endParaRPr lang="pt-PT"/>
           </a:p>
@@ -711,7 +711,7 @@
             <a:fld id="{C7C07E6F-C202-45DB-B271-3691A96DB90B}" type="datetimeFigureOut">
               <a:rPr lang="pt-PT" smtClean="0"/>
               <a:pPr/>
-              <a:t>28/03/2014</a:t>
+              <a:t>28-03-2014</a:t>
             </a:fld>
             <a:endParaRPr lang="pt-PT"/>
           </a:p>
@@ -758,7 +758,7 @@
             <a:fld id="{E72D8762-0048-4463-BB55-DBEE29A1CDAB}" type="slidenum">
               <a:rPr lang="pt-PT" smtClean="0"/>
               <a:pPr/>
-              <a:t>‹#›</a:t>
+              <a:t>‹nº›</a:t>
             </a:fld>
             <a:endParaRPr lang="pt-PT"/>
           </a:p>
@@ -942,7 +942,7 @@
             <a:fld id="{C7C07E6F-C202-45DB-B271-3691A96DB90B}" type="datetimeFigureOut">
               <a:rPr lang="pt-PT" smtClean="0"/>
               <a:pPr/>
-              <a:t>28/03/2014</a:t>
+              <a:t>28-03-2014</a:t>
             </a:fld>
             <a:endParaRPr lang="pt-PT"/>
           </a:p>
@@ -989,7 +989,7 @@
             <a:fld id="{E72D8762-0048-4463-BB55-DBEE29A1CDAB}" type="slidenum">
               <a:rPr lang="pt-PT" smtClean="0"/>
               <a:pPr/>
-              <a:t>‹#›</a:t>
+              <a:t>‹nº›</a:t>
             </a:fld>
             <a:endParaRPr lang="pt-PT"/>
           </a:p>
@@ -1225,7 +1225,7 @@
             <a:fld id="{C7C07E6F-C202-45DB-B271-3691A96DB90B}" type="datetimeFigureOut">
               <a:rPr lang="pt-PT" smtClean="0"/>
               <a:pPr/>
-              <a:t>28/03/2014</a:t>
+              <a:t>28-03-2014</a:t>
             </a:fld>
             <a:endParaRPr lang="pt-PT"/>
           </a:p>
@@ -1265,7 +1265,7 @@
             <a:fld id="{E72D8762-0048-4463-BB55-DBEE29A1CDAB}" type="slidenum">
               <a:rPr lang="pt-PT" smtClean="0"/>
               <a:pPr/>
-              <a:t>‹#›</a:t>
+              <a:t>‹nº›</a:t>
             </a:fld>
             <a:endParaRPr lang="pt-PT"/>
           </a:p>
@@ -1515,7 +1515,7 @@
             <a:fld id="{C7C07E6F-C202-45DB-B271-3691A96DB90B}" type="datetimeFigureOut">
               <a:rPr lang="pt-PT" smtClean="0"/>
               <a:pPr/>
-              <a:t>28/03/2014</a:t>
+              <a:t>28-03-2014</a:t>
             </a:fld>
             <a:endParaRPr lang="pt-PT"/>
           </a:p>
@@ -1567,7 +1567,7 @@
             <a:fld id="{E72D8762-0048-4463-BB55-DBEE29A1CDAB}" type="slidenum">
               <a:rPr lang="pt-PT" smtClean="0"/>
               <a:pPr/>
-              <a:t>‹#›</a:t>
+              <a:t>‹nº›</a:t>
             </a:fld>
             <a:endParaRPr lang="pt-PT"/>
           </a:p>
@@ -2071,7 +2071,7 @@
             <a:fld id="{C7C07E6F-C202-45DB-B271-3691A96DB90B}" type="datetimeFigureOut">
               <a:rPr lang="pt-PT" smtClean="0"/>
               <a:pPr/>
-              <a:t>28/03/2014</a:t>
+              <a:t>28-03-2014</a:t>
             </a:fld>
             <a:endParaRPr lang="pt-PT"/>
           </a:p>
@@ -2123,7 +2123,7 @@
             <a:fld id="{E72D8762-0048-4463-BB55-DBEE29A1CDAB}" type="slidenum">
               <a:rPr lang="pt-PT" smtClean="0"/>
               <a:pPr/>
-              <a:t>‹#›</a:t>
+              <a:t>‹nº›</a:t>
             </a:fld>
             <a:endParaRPr lang="pt-PT"/>
           </a:p>
@@ -2204,7 +2204,7 @@
             <a:fld id="{C7C07E6F-C202-45DB-B271-3691A96DB90B}" type="datetimeFigureOut">
               <a:rPr lang="pt-PT" smtClean="0"/>
               <a:pPr/>
-              <a:t>28/03/2014</a:t>
+              <a:t>28-03-2014</a:t>
             </a:fld>
             <a:endParaRPr lang="pt-PT"/>
           </a:p>
@@ -2251,7 +2251,7 @@
             <a:fld id="{E72D8762-0048-4463-BB55-DBEE29A1CDAB}" type="slidenum">
               <a:rPr lang="pt-PT" smtClean="0"/>
               <a:pPr/>
-              <a:t>‹#›</a:t>
+              <a:t>‹nº›</a:t>
             </a:fld>
             <a:endParaRPr lang="pt-PT"/>
           </a:p>
@@ -2356,7 +2356,7 @@
             <a:fld id="{C7C07E6F-C202-45DB-B271-3691A96DB90B}" type="datetimeFigureOut">
               <a:rPr lang="pt-PT" smtClean="0"/>
               <a:pPr/>
-              <a:t>28/03/2014</a:t>
+              <a:t>28-03-2014</a:t>
             </a:fld>
             <a:endParaRPr lang="pt-PT"/>
           </a:p>
@@ -2403,7 +2403,7 @@
             <a:fld id="{E72D8762-0048-4463-BB55-DBEE29A1CDAB}" type="slidenum">
               <a:rPr lang="pt-PT" smtClean="0"/>
               <a:pPr/>
-              <a:t>‹#›</a:t>
+              <a:t>‹nº›</a:t>
             </a:fld>
             <a:endParaRPr lang="pt-PT"/>
           </a:p>
@@ -2679,7 +2679,7 @@
             <a:fld id="{C7C07E6F-C202-45DB-B271-3691A96DB90B}" type="datetimeFigureOut">
               <a:rPr lang="pt-PT" smtClean="0"/>
               <a:pPr/>
-              <a:t>28/03/2014</a:t>
+              <a:t>28-03-2014</a:t>
             </a:fld>
             <a:endParaRPr lang="pt-PT"/>
           </a:p>
@@ -2719,7 +2719,7 @@
             <a:fld id="{E72D8762-0048-4463-BB55-DBEE29A1CDAB}" type="slidenum">
               <a:rPr lang="pt-PT" smtClean="0"/>
               <a:pPr/>
-              <a:t>‹#›</a:t>
+              <a:t>‹nº›</a:t>
             </a:fld>
             <a:endParaRPr lang="pt-PT"/>
           </a:p>
@@ -2978,7 +2978,7 @@
             <a:fld id="{C7C07E6F-C202-45DB-B271-3691A96DB90B}" type="datetimeFigureOut">
               <a:rPr lang="pt-PT" smtClean="0"/>
               <a:pPr/>
-              <a:t>28/03/2014</a:t>
+              <a:t>28-03-2014</a:t>
             </a:fld>
             <a:endParaRPr lang="pt-PT"/>
           </a:p>
@@ -3018,7 +3018,7 @@
             <a:fld id="{E72D8762-0048-4463-BB55-DBEE29A1CDAB}" type="slidenum">
               <a:rPr lang="pt-PT" smtClean="0"/>
               <a:pPr/>
-              <a:t>‹#›</a:t>
+              <a:t>‹nº›</a:t>
             </a:fld>
             <a:endParaRPr lang="pt-PT"/>
           </a:p>
@@ -3225,7 +3225,7 @@
             <a:fld id="{C7C07E6F-C202-45DB-B271-3691A96DB90B}" type="datetimeFigureOut">
               <a:rPr lang="pt-PT" smtClean="0"/>
               <a:pPr/>
-              <a:t>28/03/2014</a:t>
+              <a:t>28-03-2014</a:t>
             </a:fld>
             <a:endParaRPr lang="pt-PT"/>
           </a:p>
@@ -3269,7 +3269,7 @@
             <a:fld id="{E72D8762-0048-4463-BB55-DBEE29A1CDAB}" type="slidenum">
               <a:rPr lang="pt-PT" smtClean="0"/>
               <a:pPr/>
-              <a:t>‹#›</a:t>
+              <a:t>‹nº›</a:t>
             </a:fld>
             <a:endParaRPr lang="pt-PT"/>
           </a:p>
@@ -3790,8 +3790,13 @@
           <a:p>
             <a:r>
               <a:rPr lang="pt-PT" sz="1800" dirty="0" smtClean="0"/>
-              <a:t>Thiago Fernandes  ?????</a:t>
-            </a:r>
+              <a:t>Thiago Fernandes  </a:t>
+            </a:r>
+            <a:r>
+              <a:rPr lang="pt-PT" sz="1800" dirty="0" smtClean="0"/>
+              <a:t>17253</a:t>
+            </a:r>
+            <a:endParaRPr lang="pt-PT" sz="1800" dirty="0" smtClean="0"/>
           </a:p>
           <a:p>
             <a:r>

</xml_diff>